<commit_message>
Added fig and doc in README; added topic in Excel file
</commit_message>
<xml_diff>
--- a/presentations/premise.pptx
+++ b/presentations/premise.pptx
@@ -6,6 +6,7 @@
   </p:sldMasterIdLst>
   <p:sldIdLst>
     <p:sldId id="256" r:id="rId2"/>
+    <p:sldId id="257" r:id="rId3"/>
   </p:sldIdLst>
   <p:sldSz cx="9144000" cy="6858000" type="screen4x3"/>
   <p:notesSz cx="6858000" cy="9144000"/>
@@ -104,7 +105,65 @@
       </a:defRPr>
     </a:lvl9pPr>
   </p:defaultTextStyle>
+  <p:extLst>
+    <p:ext uri="{EFAFB233-063F-42B5-8137-9DF3F51BA10A}">
+      <p15:sldGuideLst xmlns:p15="http://schemas.microsoft.com/office/powerpoint/2012/main"/>
+    </p:ext>
+  </p:extLst>
 </p:presentation>
+</file>
+
+<file path=ppt/revisionInfo.xml><?xml version="1.0" encoding="utf-8"?>
+<p1510:revInfo xmlns:a="http://schemas.openxmlformats.org/drawingml/2006/main" xmlns:r="http://schemas.openxmlformats.org/officeDocument/2006/relationships" xmlns:p1510="http://schemas.microsoft.com/office/powerpoint/2015/10/main">
+  <p1510:revLst>
+    <p1510:client id="{A0AC8C5E-B1A7-46ED-8EB6-5EC602B7A710}" v="1" dt="2020-03-27T12:49:01.207"/>
+  </p1510:revLst>
+</p1510:revInfo>
+</file>
+
+<file path=ppt/changesInfos/changesInfo1.xml><?xml version="1.0" encoding="utf-8"?>
+<pc:chgInfo xmlns:a="http://schemas.openxmlformats.org/drawingml/2006/main" xmlns:r="http://schemas.openxmlformats.org/officeDocument/2006/relationships" xmlns:ac="http://schemas.microsoft.com/office/drawing/2013/main/command" xmlns:pc="http://schemas.microsoft.com/office/powerpoint/2013/main/command">
+  <pc:docChgLst>
+    <pc:chgData name="Jacob Juel Christensen" userId="20dd20b7-5800-4870-9ba8-6bfc406b0cbc" providerId="ADAL" clId="{A0AC8C5E-B1A7-46ED-8EB6-5EC602B7A710}"/>
+    <pc:docChg chg="undo custSel addSld modSld">
+      <pc:chgData name="Jacob Juel Christensen" userId="20dd20b7-5800-4870-9ba8-6bfc406b0cbc" providerId="ADAL" clId="{A0AC8C5E-B1A7-46ED-8EB6-5EC602B7A710}" dt="2020-03-27T12:49:18.626" v="4" actId="478"/>
+      <pc:docMkLst>
+        <pc:docMk/>
+      </pc:docMkLst>
+      <pc:sldChg chg="addSp delSp add">
+        <pc:chgData name="Jacob Juel Christensen" userId="20dd20b7-5800-4870-9ba8-6bfc406b0cbc" providerId="ADAL" clId="{A0AC8C5E-B1A7-46ED-8EB6-5EC602B7A710}" dt="2020-03-27T12:49:18.626" v="4" actId="478"/>
+        <pc:sldMkLst>
+          <pc:docMk/>
+          <pc:sldMk cId="3328741094" sldId="257"/>
+        </pc:sldMkLst>
+        <pc:spChg chg="add del">
+          <ac:chgData name="Jacob Juel Christensen" userId="20dd20b7-5800-4870-9ba8-6bfc406b0cbc" providerId="ADAL" clId="{A0AC8C5E-B1A7-46ED-8EB6-5EC602B7A710}" dt="2020-03-27T12:49:08.093" v="2" actId="478"/>
+          <ac:spMkLst>
+            <pc:docMk/>
+            <pc:sldMk cId="3328741094" sldId="257"/>
+            <ac:spMk id="21" creationId="{00000000-0000-0000-0000-000000000000}"/>
+          </ac:spMkLst>
+        </pc:spChg>
+        <pc:spChg chg="del">
+          <ac:chgData name="Jacob Juel Christensen" userId="20dd20b7-5800-4870-9ba8-6bfc406b0cbc" providerId="ADAL" clId="{A0AC8C5E-B1A7-46ED-8EB6-5EC602B7A710}" dt="2020-03-27T12:49:13.919" v="3" actId="478"/>
+          <ac:spMkLst>
+            <pc:docMk/>
+            <pc:sldMk cId="3328741094" sldId="257"/>
+            <ac:spMk id="23" creationId="{00000000-0000-0000-0000-000000000000}"/>
+          </ac:spMkLst>
+        </pc:spChg>
+        <pc:spChg chg="del">
+          <ac:chgData name="Jacob Juel Christensen" userId="20dd20b7-5800-4870-9ba8-6bfc406b0cbc" providerId="ADAL" clId="{A0AC8C5E-B1A7-46ED-8EB6-5EC602B7A710}" dt="2020-03-27T12:49:18.626" v="4" actId="478"/>
+          <ac:spMkLst>
+            <pc:docMk/>
+            <pc:sldMk cId="3328741094" sldId="257"/>
+            <ac:spMk id="25" creationId="{00000000-0000-0000-0000-000000000000}"/>
+          </ac:spMkLst>
+        </pc:spChg>
+      </pc:sldChg>
+    </pc:docChg>
+  </pc:docChgLst>
+</pc:chgInfo>
 </file>
 
 <file path=ppt/slideLayouts/slideLayout1.xml><?xml version="1.0" encoding="utf-8"?>
@@ -149,7 +208,7 @@
           </a:lstStyle>
           <a:p>
             <a:r>
-              <a:rPr lang="en-US" smtClean="0"/>
+              <a:rPr lang="en-US"/>
               <a:t>Click to edit Master title style</a:t>
             </a:r>
             <a:endParaRPr lang="en-US" dirty="0"/>
@@ -214,7 +273,7 @@
           </a:lstStyle>
           <a:p>
             <a:r>
-              <a:rPr lang="en-US" smtClean="0"/>
+              <a:rPr lang="en-US"/>
               <a:t>Click to edit Master subtitle style</a:t>
             </a:r>
             <a:endParaRPr lang="en-US" dirty="0"/>
@@ -238,7 +297,7 @@
           <a:p>
             <a:fld id="{E555C293-2A4F-463E-9D1C-AC5A0435AD4F}" type="datetimeFigureOut">
               <a:rPr lang="nb-NO" smtClean="0"/>
-              <a:t>30.09.2019</a:t>
+              <a:t>27.03.2020</a:t>
             </a:fld>
             <a:endParaRPr lang="nb-NO"/>
           </a:p>
@@ -332,7 +391,7 @@
           <a:lstStyle/>
           <a:p>
             <a:r>
-              <a:rPr lang="en-US" smtClean="0"/>
+              <a:rPr lang="en-US"/>
               <a:t>Click to edit Master title style</a:t>
             </a:r>
             <a:endParaRPr lang="en-US" dirty="0"/>
@@ -356,35 +415,35 @@
           <a:p>
             <a:pPr lvl="0"/>
             <a:r>
-              <a:rPr lang="en-US" smtClean="0"/>
+              <a:rPr lang="en-US"/>
               <a:t>Edit Master text styles</a:t>
             </a:r>
           </a:p>
           <a:p>
             <a:pPr lvl="1"/>
             <a:r>
-              <a:rPr lang="en-US" smtClean="0"/>
+              <a:rPr lang="en-US"/>
               <a:t>Second level</a:t>
             </a:r>
           </a:p>
           <a:p>
             <a:pPr lvl="2"/>
             <a:r>
-              <a:rPr lang="en-US" smtClean="0"/>
+              <a:rPr lang="en-US"/>
               <a:t>Third level</a:t>
             </a:r>
           </a:p>
           <a:p>
             <a:pPr lvl="3"/>
             <a:r>
-              <a:rPr lang="en-US" smtClean="0"/>
+              <a:rPr lang="en-US"/>
               <a:t>Fourth level</a:t>
             </a:r>
           </a:p>
           <a:p>
             <a:pPr lvl="4"/>
             <a:r>
-              <a:rPr lang="en-US" smtClean="0"/>
+              <a:rPr lang="en-US"/>
               <a:t>Fifth level</a:t>
             </a:r>
             <a:endParaRPr lang="en-US" dirty="0"/>
@@ -408,7 +467,7 @@
           <a:p>
             <a:fld id="{E555C293-2A4F-463E-9D1C-AC5A0435AD4F}" type="datetimeFigureOut">
               <a:rPr lang="nb-NO" smtClean="0"/>
-              <a:t>30.09.2019</a:t>
+              <a:t>27.03.2020</a:t>
             </a:fld>
             <a:endParaRPr lang="nb-NO"/>
           </a:p>
@@ -507,7 +566,7 @@
           <a:lstStyle/>
           <a:p>
             <a:r>
-              <a:rPr lang="en-US" smtClean="0"/>
+              <a:rPr lang="en-US"/>
               <a:t>Click to edit Master title style</a:t>
             </a:r>
             <a:endParaRPr lang="en-US" dirty="0"/>
@@ -536,35 +595,35 @@
           <a:p>
             <a:pPr lvl="0"/>
             <a:r>
-              <a:rPr lang="en-US" smtClean="0"/>
+              <a:rPr lang="en-US"/>
               <a:t>Edit Master text styles</a:t>
             </a:r>
           </a:p>
           <a:p>
             <a:pPr lvl="1"/>
             <a:r>
-              <a:rPr lang="en-US" smtClean="0"/>
+              <a:rPr lang="en-US"/>
               <a:t>Second level</a:t>
             </a:r>
           </a:p>
           <a:p>
             <a:pPr lvl="2"/>
             <a:r>
-              <a:rPr lang="en-US" smtClean="0"/>
+              <a:rPr lang="en-US"/>
               <a:t>Third level</a:t>
             </a:r>
           </a:p>
           <a:p>
             <a:pPr lvl="3"/>
             <a:r>
-              <a:rPr lang="en-US" smtClean="0"/>
+              <a:rPr lang="en-US"/>
               <a:t>Fourth level</a:t>
             </a:r>
           </a:p>
           <a:p>
             <a:pPr lvl="4"/>
             <a:r>
-              <a:rPr lang="en-US" smtClean="0"/>
+              <a:rPr lang="en-US"/>
               <a:t>Fifth level</a:t>
             </a:r>
             <a:endParaRPr lang="en-US" dirty="0"/>
@@ -588,7 +647,7 @@
           <a:p>
             <a:fld id="{E555C293-2A4F-463E-9D1C-AC5A0435AD4F}" type="datetimeFigureOut">
               <a:rPr lang="nb-NO" smtClean="0"/>
-              <a:t>30.09.2019</a:t>
+              <a:t>27.03.2020</a:t>
             </a:fld>
             <a:endParaRPr lang="nb-NO"/>
           </a:p>
@@ -682,7 +741,7 @@
           <a:lstStyle/>
           <a:p>
             <a:r>
-              <a:rPr lang="en-US" smtClean="0"/>
+              <a:rPr lang="en-US"/>
               <a:t>Click to edit Master title style</a:t>
             </a:r>
             <a:endParaRPr lang="en-US" dirty="0"/>
@@ -706,35 +765,35 @@
           <a:p>
             <a:pPr lvl="0"/>
             <a:r>
-              <a:rPr lang="en-US" smtClean="0"/>
+              <a:rPr lang="en-US"/>
               <a:t>Edit Master text styles</a:t>
             </a:r>
           </a:p>
           <a:p>
             <a:pPr lvl="1"/>
             <a:r>
-              <a:rPr lang="en-US" smtClean="0"/>
+              <a:rPr lang="en-US"/>
               <a:t>Second level</a:t>
             </a:r>
           </a:p>
           <a:p>
             <a:pPr lvl="2"/>
             <a:r>
-              <a:rPr lang="en-US" smtClean="0"/>
+              <a:rPr lang="en-US"/>
               <a:t>Third level</a:t>
             </a:r>
           </a:p>
           <a:p>
             <a:pPr lvl="3"/>
             <a:r>
-              <a:rPr lang="en-US" smtClean="0"/>
+              <a:rPr lang="en-US"/>
               <a:t>Fourth level</a:t>
             </a:r>
           </a:p>
           <a:p>
             <a:pPr lvl="4"/>
             <a:r>
-              <a:rPr lang="en-US" smtClean="0"/>
+              <a:rPr lang="en-US"/>
               <a:t>Fifth level</a:t>
             </a:r>
             <a:endParaRPr lang="en-US" dirty="0"/>
@@ -758,7 +817,7 @@
           <a:p>
             <a:fld id="{E555C293-2A4F-463E-9D1C-AC5A0435AD4F}" type="datetimeFigureOut">
               <a:rPr lang="nb-NO" smtClean="0"/>
-              <a:t>30.09.2019</a:t>
+              <a:t>27.03.2020</a:t>
             </a:fld>
             <a:endParaRPr lang="nb-NO"/>
           </a:p>
@@ -861,7 +920,7 @@
           </a:lstStyle>
           <a:p>
             <a:r>
-              <a:rPr lang="en-US" smtClean="0"/>
+              <a:rPr lang="en-US"/>
               <a:t>Click to edit Master title style</a:t>
             </a:r>
             <a:endParaRPr lang="en-US" dirty="0"/>
@@ -979,7 +1038,7 @@
           <a:p>
             <a:pPr lvl="0"/>
             <a:r>
-              <a:rPr lang="en-US" smtClean="0"/>
+              <a:rPr lang="en-US"/>
               <a:t>Edit Master text styles</a:t>
             </a:r>
           </a:p>
@@ -1002,7 +1061,7 @@
           <a:p>
             <a:fld id="{E555C293-2A4F-463E-9D1C-AC5A0435AD4F}" type="datetimeFigureOut">
               <a:rPr lang="nb-NO" smtClean="0"/>
-              <a:t>30.09.2019</a:t>
+              <a:t>27.03.2020</a:t>
             </a:fld>
             <a:endParaRPr lang="nb-NO"/>
           </a:p>
@@ -1096,7 +1155,7 @@
           <a:lstStyle/>
           <a:p>
             <a:r>
-              <a:rPr lang="en-US" smtClean="0"/>
+              <a:rPr lang="en-US"/>
               <a:t>Click to edit Master title style</a:t>
             </a:r>
             <a:endParaRPr lang="en-US" dirty="0"/>
@@ -1125,35 +1184,35 @@
           <a:p>
             <a:pPr lvl="0"/>
             <a:r>
-              <a:rPr lang="en-US" smtClean="0"/>
+              <a:rPr lang="en-US"/>
               <a:t>Edit Master text styles</a:t>
             </a:r>
           </a:p>
           <a:p>
             <a:pPr lvl="1"/>
             <a:r>
-              <a:rPr lang="en-US" smtClean="0"/>
+              <a:rPr lang="en-US"/>
               <a:t>Second level</a:t>
             </a:r>
           </a:p>
           <a:p>
             <a:pPr lvl="2"/>
             <a:r>
-              <a:rPr lang="en-US" smtClean="0"/>
+              <a:rPr lang="en-US"/>
               <a:t>Third level</a:t>
             </a:r>
           </a:p>
           <a:p>
             <a:pPr lvl="3"/>
             <a:r>
-              <a:rPr lang="en-US" smtClean="0"/>
+              <a:rPr lang="en-US"/>
               <a:t>Fourth level</a:t>
             </a:r>
           </a:p>
           <a:p>
             <a:pPr lvl="4"/>
             <a:r>
-              <a:rPr lang="en-US" smtClean="0"/>
+              <a:rPr lang="en-US"/>
               <a:t>Fifth level</a:t>
             </a:r>
             <a:endParaRPr lang="en-US" dirty="0"/>
@@ -1182,35 +1241,35 @@
           <a:p>
             <a:pPr lvl="0"/>
             <a:r>
-              <a:rPr lang="en-US" smtClean="0"/>
+              <a:rPr lang="en-US"/>
               <a:t>Edit Master text styles</a:t>
             </a:r>
           </a:p>
           <a:p>
             <a:pPr lvl="1"/>
             <a:r>
-              <a:rPr lang="en-US" smtClean="0"/>
+              <a:rPr lang="en-US"/>
               <a:t>Second level</a:t>
             </a:r>
           </a:p>
           <a:p>
             <a:pPr lvl="2"/>
             <a:r>
-              <a:rPr lang="en-US" smtClean="0"/>
+              <a:rPr lang="en-US"/>
               <a:t>Third level</a:t>
             </a:r>
           </a:p>
           <a:p>
             <a:pPr lvl="3"/>
             <a:r>
-              <a:rPr lang="en-US" smtClean="0"/>
+              <a:rPr lang="en-US"/>
               <a:t>Fourth level</a:t>
             </a:r>
           </a:p>
           <a:p>
             <a:pPr lvl="4"/>
             <a:r>
-              <a:rPr lang="en-US" smtClean="0"/>
+              <a:rPr lang="en-US"/>
               <a:t>Fifth level</a:t>
             </a:r>
             <a:endParaRPr lang="en-US" dirty="0"/>
@@ -1234,7 +1293,7 @@
           <a:p>
             <a:fld id="{E555C293-2A4F-463E-9D1C-AC5A0435AD4F}" type="datetimeFigureOut">
               <a:rPr lang="nb-NO" smtClean="0"/>
-              <a:t>30.09.2019</a:t>
+              <a:t>27.03.2020</a:t>
             </a:fld>
             <a:endParaRPr lang="nb-NO"/>
           </a:p>
@@ -1333,7 +1392,7 @@
           <a:lstStyle/>
           <a:p>
             <a:r>
-              <a:rPr lang="en-US" smtClean="0"/>
+              <a:rPr lang="en-US"/>
               <a:t>Click to edit Master title style</a:t>
             </a:r>
             <a:endParaRPr lang="en-US" dirty="0"/>
@@ -1399,7 +1458,7 @@
           <a:p>
             <a:pPr lvl="0"/>
             <a:r>
-              <a:rPr lang="en-US" smtClean="0"/>
+              <a:rPr lang="en-US"/>
               <a:t>Edit Master text styles</a:t>
             </a:r>
           </a:p>
@@ -1427,35 +1486,35 @@
           <a:p>
             <a:pPr lvl="0"/>
             <a:r>
-              <a:rPr lang="en-US" smtClean="0"/>
+              <a:rPr lang="en-US"/>
               <a:t>Edit Master text styles</a:t>
             </a:r>
           </a:p>
           <a:p>
             <a:pPr lvl="1"/>
             <a:r>
-              <a:rPr lang="en-US" smtClean="0"/>
+              <a:rPr lang="en-US"/>
               <a:t>Second level</a:t>
             </a:r>
           </a:p>
           <a:p>
             <a:pPr lvl="2"/>
             <a:r>
-              <a:rPr lang="en-US" smtClean="0"/>
+              <a:rPr lang="en-US"/>
               <a:t>Third level</a:t>
             </a:r>
           </a:p>
           <a:p>
             <a:pPr lvl="3"/>
             <a:r>
-              <a:rPr lang="en-US" smtClean="0"/>
+              <a:rPr lang="en-US"/>
               <a:t>Fourth level</a:t>
             </a:r>
           </a:p>
           <a:p>
             <a:pPr lvl="4"/>
             <a:r>
-              <a:rPr lang="en-US" smtClean="0"/>
+              <a:rPr lang="en-US"/>
               <a:t>Fifth level</a:t>
             </a:r>
             <a:endParaRPr lang="en-US" dirty="0"/>
@@ -1521,7 +1580,7 @@
           <a:p>
             <a:pPr lvl="0"/>
             <a:r>
-              <a:rPr lang="en-US" smtClean="0"/>
+              <a:rPr lang="en-US"/>
               <a:t>Edit Master text styles</a:t>
             </a:r>
           </a:p>
@@ -1549,35 +1608,35 @@
           <a:p>
             <a:pPr lvl="0"/>
             <a:r>
-              <a:rPr lang="en-US" smtClean="0"/>
+              <a:rPr lang="en-US"/>
               <a:t>Edit Master text styles</a:t>
             </a:r>
           </a:p>
           <a:p>
             <a:pPr lvl="1"/>
             <a:r>
-              <a:rPr lang="en-US" smtClean="0"/>
+              <a:rPr lang="en-US"/>
               <a:t>Second level</a:t>
             </a:r>
           </a:p>
           <a:p>
             <a:pPr lvl="2"/>
             <a:r>
-              <a:rPr lang="en-US" smtClean="0"/>
+              <a:rPr lang="en-US"/>
               <a:t>Third level</a:t>
             </a:r>
           </a:p>
           <a:p>
             <a:pPr lvl="3"/>
             <a:r>
-              <a:rPr lang="en-US" smtClean="0"/>
+              <a:rPr lang="en-US"/>
               <a:t>Fourth level</a:t>
             </a:r>
           </a:p>
           <a:p>
             <a:pPr lvl="4"/>
             <a:r>
-              <a:rPr lang="en-US" smtClean="0"/>
+              <a:rPr lang="en-US"/>
               <a:t>Fifth level</a:t>
             </a:r>
             <a:endParaRPr lang="en-US" dirty="0"/>
@@ -1601,7 +1660,7 @@
           <a:p>
             <a:fld id="{E555C293-2A4F-463E-9D1C-AC5A0435AD4F}" type="datetimeFigureOut">
               <a:rPr lang="nb-NO" smtClean="0"/>
-              <a:t>30.09.2019</a:t>
+              <a:t>27.03.2020</a:t>
             </a:fld>
             <a:endParaRPr lang="nb-NO"/>
           </a:p>
@@ -1695,7 +1754,7 @@
           <a:lstStyle/>
           <a:p>
             <a:r>
-              <a:rPr lang="en-US" smtClean="0"/>
+              <a:rPr lang="en-US"/>
               <a:t>Click to edit Master title style</a:t>
             </a:r>
             <a:endParaRPr lang="en-US" dirty="0"/>
@@ -1719,7 +1778,7 @@
           <a:p>
             <a:fld id="{E555C293-2A4F-463E-9D1C-AC5A0435AD4F}" type="datetimeFigureOut">
               <a:rPr lang="nb-NO" smtClean="0"/>
-              <a:t>30.09.2019</a:t>
+              <a:t>27.03.2020</a:t>
             </a:fld>
             <a:endParaRPr lang="nb-NO"/>
           </a:p>
@@ -1814,7 +1873,7 @@
           <a:p>
             <a:fld id="{E555C293-2A4F-463E-9D1C-AC5A0435AD4F}" type="datetimeFigureOut">
               <a:rPr lang="nb-NO" smtClean="0"/>
-              <a:t>30.09.2019</a:t>
+              <a:t>27.03.2020</a:t>
             </a:fld>
             <a:endParaRPr lang="nb-NO"/>
           </a:p>
@@ -1917,7 +1976,7 @@
           </a:lstStyle>
           <a:p>
             <a:r>
-              <a:rPr lang="en-US" smtClean="0"/>
+              <a:rPr lang="en-US"/>
               <a:t>Click to edit Master title style</a:t>
             </a:r>
             <a:endParaRPr lang="en-US" dirty="0"/>
@@ -1974,35 +2033,35 @@
           <a:p>
             <a:pPr lvl="0"/>
             <a:r>
-              <a:rPr lang="en-US" smtClean="0"/>
+              <a:rPr lang="en-US"/>
               <a:t>Edit Master text styles</a:t>
             </a:r>
           </a:p>
           <a:p>
             <a:pPr lvl="1"/>
             <a:r>
-              <a:rPr lang="en-US" smtClean="0"/>
+              <a:rPr lang="en-US"/>
               <a:t>Second level</a:t>
             </a:r>
           </a:p>
           <a:p>
             <a:pPr lvl="2"/>
             <a:r>
-              <a:rPr lang="en-US" smtClean="0"/>
+              <a:rPr lang="en-US"/>
               <a:t>Third level</a:t>
             </a:r>
           </a:p>
           <a:p>
             <a:pPr lvl="3"/>
             <a:r>
-              <a:rPr lang="en-US" smtClean="0"/>
+              <a:rPr lang="en-US"/>
               <a:t>Fourth level</a:t>
             </a:r>
           </a:p>
           <a:p>
             <a:pPr lvl="4"/>
             <a:r>
-              <a:rPr lang="en-US" smtClean="0"/>
+              <a:rPr lang="en-US"/>
               <a:t>Fifth level</a:t>
             </a:r>
             <a:endParaRPr lang="en-US" dirty="0"/>
@@ -2068,7 +2127,7 @@
           <a:p>
             <a:pPr lvl="0"/>
             <a:r>
-              <a:rPr lang="en-US" smtClean="0"/>
+              <a:rPr lang="en-US"/>
               <a:t>Edit Master text styles</a:t>
             </a:r>
           </a:p>
@@ -2091,7 +2150,7 @@
           <a:p>
             <a:fld id="{E555C293-2A4F-463E-9D1C-AC5A0435AD4F}" type="datetimeFigureOut">
               <a:rPr lang="nb-NO" smtClean="0"/>
-              <a:t>30.09.2019</a:t>
+              <a:t>27.03.2020</a:t>
             </a:fld>
             <a:endParaRPr lang="nb-NO"/>
           </a:p>
@@ -2194,7 +2253,7 @@
           </a:lstStyle>
           <a:p>
             <a:r>
-              <a:rPr lang="en-US" smtClean="0"/>
+              <a:rPr lang="en-US"/>
               <a:t>Click to edit Master title style</a:t>
             </a:r>
             <a:endParaRPr lang="en-US" dirty="0"/>
@@ -2259,7 +2318,7 @@
           </a:lstStyle>
           <a:p>
             <a:r>
-              <a:rPr lang="en-US" smtClean="0"/>
+              <a:rPr lang="en-US"/>
               <a:t>Click icon to add picture</a:t>
             </a:r>
             <a:endParaRPr lang="en-US" dirty="0"/>
@@ -2325,7 +2384,7 @@
           <a:p>
             <a:pPr lvl="0"/>
             <a:r>
-              <a:rPr lang="en-US" smtClean="0"/>
+              <a:rPr lang="en-US"/>
               <a:t>Edit Master text styles</a:t>
             </a:r>
           </a:p>
@@ -2348,7 +2407,7 @@
           <a:p>
             <a:fld id="{E555C293-2A4F-463E-9D1C-AC5A0435AD4F}" type="datetimeFigureOut">
               <a:rPr lang="nb-NO" smtClean="0"/>
-              <a:t>30.09.2019</a:t>
+              <a:t>27.03.2020</a:t>
             </a:fld>
             <a:endParaRPr lang="nb-NO"/>
           </a:p>
@@ -2457,7 +2516,7 @@
           <a:lstStyle/>
           <a:p>
             <a:r>
-              <a:rPr lang="en-US" smtClean="0"/>
+              <a:rPr lang="en-US"/>
               <a:t>Click to edit Master title style</a:t>
             </a:r>
             <a:endParaRPr lang="en-US" dirty="0"/>
@@ -2491,35 +2550,35 @@
           <a:p>
             <a:pPr lvl="0"/>
             <a:r>
-              <a:rPr lang="en-US" smtClean="0"/>
+              <a:rPr lang="en-US"/>
               <a:t>Edit Master text styles</a:t>
             </a:r>
           </a:p>
           <a:p>
             <a:pPr lvl="1"/>
             <a:r>
-              <a:rPr lang="en-US" smtClean="0"/>
+              <a:rPr lang="en-US"/>
               <a:t>Second level</a:t>
             </a:r>
           </a:p>
           <a:p>
             <a:pPr lvl="2"/>
             <a:r>
-              <a:rPr lang="en-US" smtClean="0"/>
+              <a:rPr lang="en-US"/>
               <a:t>Third level</a:t>
             </a:r>
           </a:p>
           <a:p>
             <a:pPr lvl="3"/>
             <a:r>
-              <a:rPr lang="en-US" smtClean="0"/>
+              <a:rPr lang="en-US"/>
               <a:t>Fourth level</a:t>
             </a:r>
           </a:p>
           <a:p>
             <a:pPr lvl="4"/>
             <a:r>
-              <a:rPr lang="en-US" smtClean="0"/>
+              <a:rPr lang="en-US"/>
               <a:t>Fifth level</a:t>
             </a:r>
             <a:endParaRPr lang="en-US" dirty="0"/>
@@ -2561,7 +2620,7 @@
           <a:p>
             <a:fld id="{E555C293-2A4F-463E-9D1C-AC5A0435AD4F}" type="datetimeFigureOut">
               <a:rPr lang="nb-NO" smtClean="0"/>
-              <a:t>30.09.2019</a:t>
+              <a:t>27.03.2020</a:t>
             </a:fld>
             <a:endParaRPr lang="nb-NO"/>
           </a:p>
@@ -3071,10 +3130,9 @@
           <a:lstStyle/>
           <a:p>
             <a:r>
-              <a:rPr lang="nb-NO" dirty="0" smtClean="0"/>
+              <a:rPr lang="nb-NO" dirty="0"/>
               <a:t>Planning</a:t>
             </a:r>
-            <a:endParaRPr lang="nb-NO" dirty="0"/>
           </a:p>
         </p:txBody>
       </p:sp>
@@ -3101,10 +3159,9 @@
           <a:lstStyle/>
           <a:p>
             <a:r>
-              <a:rPr lang="nb-NO" dirty="0" smtClean="0"/>
+              <a:rPr lang="nb-NO" dirty="0"/>
               <a:t>Management</a:t>
             </a:r>
-            <a:endParaRPr lang="nb-NO" dirty="0"/>
           </a:p>
         </p:txBody>
       </p:sp>
@@ -3131,11 +3188,11 @@
           <a:lstStyle/>
           <a:p>
             <a:r>
-              <a:rPr lang="nb-NO" dirty="0" smtClean="0"/>
+              <a:rPr lang="nb-NO" dirty="0"/>
               <a:t>Data </a:t>
             </a:r>
             <a:r>
-              <a:rPr lang="nb-NO" dirty="0" err="1" smtClean="0"/>
+              <a:rPr lang="nb-NO" dirty="0" err="1"/>
               <a:t>collection</a:t>
             </a:r>
             <a:endParaRPr lang="nb-NO" dirty="0"/>
@@ -3165,11 +3222,11 @@
           <a:lstStyle/>
           <a:p>
             <a:r>
-              <a:rPr lang="nb-NO" dirty="0" smtClean="0"/>
+              <a:rPr lang="nb-NO" dirty="0"/>
               <a:t>Data </a:t>
             </a:r>
             <a:r>
-              <a:rPr lang="nb-NO" dirty="0" err="1" smtClean="0"/>
+              <a:rPr lang="nb-NO" dirty="0" err="1"/>
               <a:t>analysis</a:t>
             </a:r>
             <a:endParaRPr lang="nb-NO" dirty="0"/>
@@ -3199,7 +3256,7 @@
           <a:lstStyle/>
           <a:p>
             <a:r>
-              <a:rPr lang="nb-NO" dirty="0" err="1" smtClean="0"/>
+              <a:rPr lang="nb-NO" dirty="0" err="1"/>
               <a:t>Communication</a:t>
             </a:r>
             <a:endParaRPr lang="nb-NO" dirty="0"/>
@@ -3228,7 +3285,7 @@
           <a:lstStyle/>
           <a:p>
             <a:r>
-              <a:rPr lang="en-US" sz="1400" dirty="0" smtClean="0">
+              <a:rPr lang="en-US" sz="1400" dirty="0">
                 <a:solidFill>
                   <a:schemeClr val="bg1">
                     <a:lumMod val="50000"/>
@@ -3237,13 +3294,6 @@
               </a:rPr>
               <a:t>Organization</a:t>
             </a:r>
-            <a:endParaRPr lang="en-US" sz="1400" dirty="0">
-              <a:solidFill>
-                <a:schemeClr val="bg1">
-                  <a:lumMod val="50000"/>
-                </a:schemeClr>
-              </a:solidFill>
-            </a:endParaRPr>
           </a:p>
         </p:txBody>
       </p:sp>
@@ -3269,7 +3319,7 @@
           <a:lstStyle/>
           <a:p>
             <a:r>
-              <a:rPr lang="en-US" sz="1400" dirty="0" smtClean="0">
+              <a:rPr lang="en-US" sz="1400" dirty="0">
                 <a:solidFill>
                   <a:schemeClr val="bg1">
                     <a:lumMod val="50000"/>
@@ -3278,13 +3328,6 @@
               </a:rPr>
               <a:t>Ethics/governance</a:t>
             </a:r>
-            <a:endParaRPr lang="en-US" sz="1400" dirty="0">
-              <a:solidFill>
-                <a:schemeClr val="bg1">
-                  <a:lumMod val="50000"/>
-                </a:schemeClr>
-              </a:solidFill>
-            </a:endParaRPr>
           </a:p>
         </p:txBody>
       </p:sp>
@@ -3317,25 +3360,8 @@
                   </a:schemeClr>
                 </a:solidFill>
               </a:rPr>
-              <a:t>Data </a:t>
-            </a:r>
-            <a:r>
-              <a:rPr lang="en-US" sz="1400" dirty="0" smtClean="0">
-                <a:solidFill>
-                  <a:schemeClr val="bg1">
-                    <a:lumMod val="50000"/>
-                  </a:schemeClr>
-                </a:solidFill>
-              </a:rPr>
-              <a:t>science</a:t>
-            </a:r>
-            <a:endParaRPr lang="en-US" sz="1400" dirty="0">
-              <a:solidFill>
-                <a:schemeClr val="bg1">
-                  <a:lumMod val="50000"/>
-                </a:schemeClr>
-              </a:solidFill>
-            </a:endParaRPr>
+              <a:t>Data science</a:t>
+            </a:r>
           </a:p>
         </p:txBody>
       </p:sp>
@@ -3368,25 +3394,8 @@
                   </a:schemeClr>
                 </a:solidFill>
               </a:rPr>
-              <a:t>Scientific </a:t>
-            </a:r>
-            <a:r>
-              <a:rPr lang="en-US" sz="1400" dirty="0" smtClean="0">
-                <a:solidFill>
-                  <a:schemeClr val="bg1">
-                    <a:lumMod val="50000"/>
-                  </a:schemeClr>
-                </a:solidFill>
-              </a:rPr>
-              <a:t>writing</a:t>
-            </a:r>
-            <a:endParaRPr lang="en-US" sz="1400" dirty="0">
-              <a:solidFill>
-                <a:schemeClr val="bg1">
-                  <a:lumMod val="50000"/>
-                </a:schemeClr>
-              </a:solidFill>
-            </a:endParaRPr>
+              <a:t>Scientific writing</a:t>
+            </a:r>
           </a:p>
         </p:txBody>
       </p:sp>
@@ -3453,25 +3462,8 @@
                   </a:schemeClr>
                 </a:solidFill>
               </a:rPr>
-              <a:t>Domain </a:t>
-            </a:r>
-            <a:r>
-              <a:rPr lang="en-US" sz="1400" dirty="0" smtClean="0">
-                <a:solidFill>
-                  <a:schemeClr val="bg1">
-                    <a:lumMod val="50000"/>
-                  </a:schemeClr>
-                </a:solidFill>
-              </a:rPr>
-              <a:t>expertise</a:t>
-            </a:r>
-            <a:endParaRPr lang="en-US" sz="1400" dirty="0">
-              <a:solidFill>
-                <a:schemeClr val="bg1">
-                  <a:lumMod val="50000"/>
-                </a:schemeClr>
-              </a:solidFill>
-            </a:endParaRPr>
+              <a:t>Domain expertise</a:t>
+            </a:r>
           </a:p>
         </p:txBody>
       </p:sp>
@@ -3497,7 +3489,7 @@
           <a:lstStyle/>
           <a:p>
             <a:r>
-              <a:rPr lang="en-US" sz="1400" dirty="0" smtClean="0">
+              <a:rPr lang="en-US" sz="1400" dirty="0">
                 <a:solidFill>
                   <a:schemeClr val="bg1">
                     <a:lumMod val="50000"/>
@@ -3506,13 +3498,6 @@
               </a:rPr>
               <a:t>Collaboration</a:t>
             </a:r>
-            <a:endParaRPr lang="en-US" sz="1400" dirty="0">
-              <a:solidFill>
-                <a:schemeClr val="bg1">
-                  <a:lumMod val="50000"/>
-                </a:schemeClr>
-              </a:solidFill>
-            </a:endParaRPr>
           </a:p>
         </p:txBody>
       </p:sp>
@@ -3580,7 +3565,7 @@
           <a:lstStyle/>
           <a:p>
             <a:r>
-              <a:rPr lang="nb-NO" sz="1400" dirty="0" smtClean="0">
+              <a:rPr lang="nb-NO" sz="1400" dirty="0">
                 <a:solidFill>
                   <a:schemeClr val="bg1">
                     <a:lumMod val="50000"/>
@@ -3589,13 +3574,6 @@
               </a:rPr>
               <a:t>Lab</a:t>
             </a:r>
-            <a:endParaRPr lang="nb-NO" sz="1400" dirty="0">
-              <a:solidFill>
-                <a:schemeClr val="bg1">
-                  <a:lumMod val="50000"/>
-                </a:schemeClr>
-              </a:solidFill>
-            </a:endParaRPr>
           </a:p>
         </p:txBody>
       </p:sp>
@@ -3621,7 +3599,7 @@
           <a:lstStyle/>
           <a:p>
             <a:r>
-              <a:rPr lang="en-US" sz="1400" dirty="0" smtClean="0">
+              <a:rPr lang="en-US" sz="1400" dirty="0">
                 <a:solidFill>
                   <a:schemeClr val="bg1">
                     <a:lumMod val="50000"/>
@@ -3630,13 +3608,6 @@
               </a:rPr>
               <a:t>Statistics</a:t>
             </a:r>
-            <a:endParaRPr lang="en-US" sz="1400" dirty="0">
-              <a:solidFill>
-                <a:schemeClr val="bg1">
-                  <a:lumMod val="50000"/>
-                </a:schemeClr>
-              </a:solidFill>
-            </a:endParaRPr>
           </a:p>
         </p:txBody>
       </p:sp>
@@ -3708,7 +3679,7 @@
           <a:lstStyle/>
           <a:p>
             <a:r>
-              <a:rPr lang="en-US" sz="1400" dirty="0" smtClean="0">
+              <a:rPr lang="en-US" sz="1400" dirty="0">
                 <a:solidFill>
                   <a:schemeClr val="bg1">
                     <a:lumMod val="50000"/>
@@ -3717,13 +3688,6 @@
               </a:rPr>
               <a:t>Learn and use R</a:t>
             </a:r>
-            <a:endParaRPr lang="en-US" sz="1400" dirty="0">
-              <a:solidFill>
-                <a:schemeClr val="bg1">
-                  <a:lumMod val="50000"/>
-                </a:schemeClr>
-              </a:solidFill>
-            </a:endParaRPr>
           </a:p>
         </p:txBody>
       </p:sp>
@@ -3749,7 +3713,7 @@
           <a:lstStyle/>
           <a:p>
             <a:r>
-              <a:rPr lang="en-US" sz="1400" dirty="0" smtClean="0">
+              <a:rPr lang="en-US" sz="1400" dirty="0">
                 <a:solidFill>
                   <a:schemeClr val="bg1">
                     <a:lumMod val="50000"/>
@@ -3758,13 +3722,6 @@
               </a:rPr>
               <a:t>Documents</a:t>
             </a:r>
-            <a:endParaRPr lang="en-US" sz="1400" dirty="0">
-              <a:solidFill>
-                <a:schemeClr val="bg1">
-                  <a:lumMod val="50000"/>
-                </a:schemeClr>
-              </a:solidFill>
-            </a:endParaRPr>
           </a:p>
         </p:txBody>
       </p:sp>
@@ -3790,7 +3747,7 @@
           <a:lstStyle/>
           <a:p>
             <a:r>
-              <a:rPr lang="en-US" sz="1400" dirty="0" smtClean="0">
+              <a:rPr lang="en-US" sz="1400" dirty="0">
                 <a:solidFill>
                   <a:schemeClr val="bg1">
                     <a:lumMod val="50000"/>
@@ -3824,7 +3781,7 @@
           <a:lstStyle/>
           <a:p>
             <a:r>
-              <a:rPr lang="en-US" sz="1400" dirty="0" smtClean="0">
+              <a:rPr lang="en-US" sz="1400" dirty="0">
                 <a:solidFill>
                   <a:schemeClr val="bg1">
                     <a:lumMod val="50000"/>
@@ -3833,13 +3790,6 @@
               </a:rPr>
               <a:t>Management tools</a:t>
             </a:r>
-            <a:endParaRPr lang="en-US" sz="1400" dirty="0">
-              <a:solidFill>
-                <a:schemeClr val="bg1">
-                  <a:lumMod val="50000"/>
-                </a:schemeClr>
-              </a:solidFill>
-            </a:endParaRPr>
           </a:p>
         </p:txBody>
       </p:sp>
@@ -3865,7 +3815,7 @@
           <a:lstStyle/>
           <a:p>
             <a:r>
-              <a:rPr lang="en-US" sz="1400" dirty="0" smtClean="0">
+              <a:rPr lang="en-US" sz="1400" dirty="0">
                 <a:solidFill>
                   <a:schemeClr val="bg1">
                     <a:lumMod val="50000"/>
@@ -3874,7 +3824,501 @@
               </a:rPr>
               <a:t>Excel</a:t>
             </a:r>
-            <a:endParaRPr lang="en-US" sz="1400" dirty="0">
+          </a:p>
+        </p:txBody>
+      </p:sp>
+    </p:spTree>
+    <p:extLst>
+      <p:ext uri="{BB962C8B-B14F-4D97-AF65-F5344CB8AC3E}">
+        <p14:creationId xmlns:p14="http://schemas.microsoft.com/office/powerpoint/2010/main" val="1141600645"/>
+      </p:ext>
+    </p:extLst>
+  </p:cSld>
+  <p:clrMapOvr>
+    <a:masterClrMapping/>
+  </p:clrMapOvr>
+</p:sld>
+</file>
+
+<file path=ppt/slides/slide2.xml><?xml version="1.0" encoding="utf-8"?>
+<p:sld xmlns:a="http://schemas.openxmlformats.org/drawingml/2006/main" xmlns:r="http://schemas.openxmlformats.org/officeDocument/2006/relationships" xmlns:p="http://schemas.openxmlformats.org/presentationml/2006/main">
+  <p:cSld>
+    <p:spTree>
+      <p:nvGrpSpPr>
+        <p:cNvPr id="1" name=""/>
+        <p:cNvGrpSpPr/>
+        <p:nvPr/>
+      </p:nvGrpSpPr>
+      <p:grpSpPr>
+        <a:xfrm>
+          <a:off x="0" y="0"/>
+          <a:ext cx="0" cy="0"/>
+          <a:chOff x="0" y="0"/>
+          <a:chExt cx="0" cy="0"/>
+        </a:xfrm>
+      </p:grpSpPr>
+      <p:cxnSp>
+        <p:nvCxnSpPr>
+          <p:cNvPr id="5" name="Straight Arrow Connector 4"/>
+          <p:cNvCxnSpPr/>
+          <p:nvPr/>
+        </p:nvCxnSpPr>
+        <p:spPr>
+          <a:xfrm>
+            <a:off x="598515" y="3433156"/>
+            <a:ext cx="7920000" cy="0"/>
+          </a:xfrm>
+          <a:prstGeom prst="straightConnector1">
+            <a:avLst/>
+          </a:prstGeom>
+          <a:ln>
+            <a:solidFill>
+              <a:schemeClr val="tx1"/>
+            </a:solidFill>
+            <a:tailEnd type="triangle"/>
+          </a:ln>
+        </p:spPr>
+        <p:style>
+          <a:lnRef idx="1">
+            <a:schemeClr val="accent1"/>
+          </a:lnRef>
+          <a:fillRef idx="0">
+            <a:schemeClr val="accent1"/>
+          </a:fillRef>
+          <a:effectRef idx="0">
+            <a:schemeClr val="accent1"/>
+          </a:effectRef>
+          <a:fontRef idx="minor">
+            <a:schemeClr val="tx1"/>
+          </a:fontRef>
+        </p:style>
+      </p:cxnSp>
+      <p:sp>
+        <p:nvSpPr>
+          <p:cNvPr id="8" name="TextBox 7"/>
+          <p:cNvSpPr txBox="1"/>
+          <p:nvPr/>
+        </p:nvSpPr>
+        <p:spPr>
+          <a:xfrm>
+            <a:off x="101423" y="3009791"/>
+            <a:ext cx="994183" cy="369332"/>
+          </a:xfrm>
+          <a:prstGeom prst="rect">
+            <a:avLst/>
+          </a:prstGeom>
+          <a:noFill/>
+        </p:spPr>
+        <p:txBody>
+          <a:bodyPr wrap="none" rtlCol="0">
+            <a:spAutoFit/>
+          </a:bodyPr>
+          <a:lstStyle/>
+          <a:p>
+            <a:r>
+              <a:rPr lang="nb-NO" dirty="0"/>
+              <a:t>Planning</a:t>
+            </a:r>
+          </a:p>
+        </p:txBody>
+      </p:sp>
+      <p:sp>
+        <p:nvSpPr>
+          <p:cNvPr id="9" name="TextBox 8"/>
+          <p:cNvSpPr txBox="1"/>
+          <p:nvPr/>
+        </p:nvSpPr>
+        <p:spPr>
+          <a:xfrm>
+            <a:off x="1557494" y="3496086"/>
+            <a:ext cx="1443793" cy="369332"/>
+          </a:xfrm>
+          <a:prstGeom prst="rect">
+            <a:avLst/>
+          </a:prstGeom>
+          <a:noFill/>
+        </p:spPr>
+        <p:txBody>
+          <a:bodyPr wrap="none" rtlCol="0">
+            <a:spAutoFit/>
+          </a:bodyPr>
+          <a:lstStyle/>
+          <a:p>
+            <a:r>
+              <a:rPr lang="nb-NO" dirty="0"/>
+              <a:t>Management</a:t>
+            </a:r>
+          </a:p>
+        </p:txBody>
+      </p:sp>
+      <p:sp>
+        <p:nvSpPr>
+          <p:cNvPr id="10" name="TextBox 9"/>
+          <p:cNvSpPr txBox="1"/>
+          <p:nvPr/>
+        </p:nvSpPr>
+        <p:spPr>
+          <a:xfrm>
+            <a:off x="3463175" y="3009791"/>
+            <a:ext cx="1583639" cy="369332"/>
+          </a:xfrm>
+          <a:prstGeom prst="rect">
+            <a:avLst/>
+          </a:prstGeom>
+          <a:noFill/>
+        </p:spPr>
+        <p:txBody>
+          <a:bodyPr wrap="none" rtlCol="0">
+            <a:spAutoFit/>
+          </a:bodyPr>
+          <a:lstStyle/>
+          <a:p>
+            <a:r>
+              <a:rPr lang="nb-NO" dirty="0"/>
+              <a:t>Data </a:t>
+            </a:r>
+            <a:r>
+              <a:rPr lang="nb-NO" dirty="0" err="1"/>
+              <a:t>collection</a:t>
+            </a:r>
+            <a:endParaRPr lang="nb-NO" dirty="0"/>
+          </a:p>
+        </p:txBody>
+      </p:sp>
+      <p:sp>
+        <p:nvSpPr>
+          <p:cNvPr id="11" name="TextBox 10"/>
+          <p:cNvSpPr txBox="1"/>
+          <p:nvPr/>
+        </p:nvSpPr>
+        <p:spPr>
+          <a:xfrm>
+            <a:off x="5508702" y="3496086"/>
+            <a:ext cx="1403910" cy="369332"/>
+          </a:xfrm>
+          <a:prstGeom prst="rect">
+            <a:avLst/>
+          </a:prstGeom>
+          <a:noFill/>
+        </p:spPr>
+        <p:txBody>
+          <a:bodyPr wrap="none" rtlCol="0">
+            <a:spAutoFit/>
+          </a:bodyPr>
+          <a:lstStyle/>
+          <a:p>
+            <a:r>
+              <a:rPr lang="nb-NO" dirty="0"/>
+              <a:t>Data </a:t>
+            </a:r>
+            <a:r>
+              <a:rPr lang="nb-NO" dirty="0" err="1"/>
+              <a:t>analysis</a:t>
+            </a:r>
+            <a:endParaRPr lang="nb-NO" dirty="0"/>
+          </a:p>
+        </p:txBody>
+      </p:sp>
+      <p:sp>
+        <p:nvSpPr>
+          <p:cNvPr id="12" name="TextBox 11"/>
+          <p:cNvSpPr txBox="1"/>
+          <p:nvPr/>
+        </p:nvSpPr>
+        <p:spPr>
+          <a:xfrm>
+            <a:off x="7374498" y="3009791"/>
+            <a:ext cx="1673022" cy="369332"/>
+          </a:xfrm>
+          <a:prstGeom prst="rect">
+            <a:avLst/>
+          </a:prstGeom>
+          <a:noFill/>
+        </p:spPr>
+        <p:txBody>
+          <a:bodyPr wrap="none" rtlCol="0">
+            <a:spAutoFit/>
+          </a:bodyPr>
+          <a:lstStyle/>
+          <a:p>
+            <a:r>
+              <a:rPr lang="nb-NO" dirty="0" err="1"/>
+              <a:t>Communication</a:t>
+            </a:r>
+            <a:endParaRPr lang="nb-NO" dirty="0"/>
+          </a:p>
+        </p:txBody>
+      </p:sp>
+      <p:sp>
+        <p:nvSpPr>
+          <p:cNvPr id="13" name="Rectangle 12"/>
+          <p:cNvSpPr/>
+          <p:nvPr/>
+        </p:nvSpPr>
+        <p:spPr>
+          <a:xfrm>
+            <a:off x="731519" y="2516661"/>
+            <a:ext cx="1130924" cy="307777"/>
+          </a:xfrm>
+          <a:prstGeom prst="rect">
+            <a:avLst/>
+          </a:prstGeom>
+        </p:spPr>
+        <p:txBody>
+          <a:bodyPr wrap="square">
+            <a:spAutoFit/>
+          </a:bodyPr>
+          <a:lstStyle/>
+          <a:p>
+            <a:r>
+              <a:rPr lang="en-US" sz="1400" dirty="0">
+                <a:solidFill>
+                  <a:schemeClr val="bg1">
+                    <a:lumMod val="50000"/>
+                  </a:schemeClr>
+                </a:solidFill>
+              </a:rPr>
+              <a:t>Organization</a:t>
+            </a:r>
+          </a:p>
+        </p:txBody>
+      </p:sp>
+      <p:sp>
+        <p:nvSpPr>
+          <p:cNvPr id="14" name="Rectangle 13"/>
+          <p:cNvSpPr/>
+          <p:nvPr/>
+        </p:nvSpPr>
+        <p:spPr>
+          <a:xfrm>
+            <a:off x="540717" y="3987841"/>
+            <a:ext cx="1529543" cy="307777"/>
+          </a:xfrm>
+          <a:prstGeom prst="rect">
+            <a:avLst/>
+          </a:prstGeom>
+        </p:spPr>
+        <p:txBody>
+          <a:bodyPr wrap="square">
+            <a:spAutoFit/>
+          </a:bodyPr>
+          <a:lstStyle/>
+          <a:p>
+            <a:r>
+              <a:rPr lang="en-US" sz="1400" dirty="0">
+                <a:solidFill>
+                  <a:schemeClr val="bg1">
+                    <a:lumMod val="50000"/>
+                  </a:schemeClr>
+                </a:solidFill>
+              </a:rPr>
+              <a:t>Ethics/governance</a:t>
+            </a:r>
+          </a:p>
+        </p:txBody>
+      </p:sp>
+      <p:sp>
+        <p:nvSpPr>
+          <p:cNvPr id="15" name="Rectangle 14"/>
+          <p:cNvSpPr/>
+          <p:nvPr/>
+        </p:nvSpPr>
+        <p:spPr>
+          <a:xfrm>
+            <a:off x="5324836" y="4678613"/>
+            <a:ext cx="1107837" cy="307777"/>
+          </a:xfrm>
+          <a:prstGeom prst="rect">
+            <a:avLst/>
+          </a:prstGeom>
+        </p:spPr>
+        <p:txBody>
+          <a:bodyPr wrap="square">
+            <a:spAutoFit/>
+          </a:bodyPr>
+          <a:lstStyle/>
+          <a:p>
+            <a:r>
+              <a:rPr lang="en-US" sz="1400" dirty="0">
+                <a:solidFill>
+                  <a:schemeClr val="bg1">
+                    <a:lumMod val="50000"/>
+                  </a:schemeClr>
+                </a:solidFill>
+              </a:rPr>
+              <a:t>Data science</a:t>
+            </a:r>
+          </a:p>
+        </p:txBody>
+      </p:sp>
+      <p:sp>
+        <p:nvSpPr>
+          <p:cNvPr id="16" name="Rectangle 15"/>
+          <p:cNvSpPr/>
+          <p:nvPr/>
+        </p:nvSpPr>
+        <p:spPr>
+          <a:xfrm>
+            <a:off x="6434061" y="2322237"/>
+            <a:ext cx="1479648" cy="307777"/>
+          </a:xfrm>
+          <a:prstGeom prst="rect">
+            <a:avLst/>
+          </a:prstGeom>
+        </p:spPr>
+        <p:txBody>
+          <a:bodyPr wrap="square">
+            <a:spAutoFit/>
+          </a:bodyPr>
+          <a:lstStyle/>
+          <a:p>
+            <a:r>
+              <a:rPr lang="en-US" sz="1400" dirty="0">
+                <a:solidFill>
+                  <a:schemeClr val="bg1">
+                    <a:lumMod val="50000"/>
+                  </a:schemeClr>
+                </a:solidFill>
+              </a:rPr>
+              <a:t>Scientific writing</a:t>
+            </a:r>
+          </a:p>
+        </p:txBody>
+      </p:sp>
+      <p:sp>
+        <p:nvSpPr>
+          <p:cNvPr id="17" name="Rectangle 16"/>
+          <p:cNvSpPr/>
+          <p:nvPr/>
+        </p:nvSpPr>
+        <p:spPr>
+          <a:xfrm>
+            <a:off x="6711644" y="4272292"/>
+            <a:ext cx="1806871" cy="307777"/>
+          </a:xfrm>
+          <a:prstGeom prst="rect">
+            <a:avLst/>
+          </a:prstGeom>
+        </p:spPr>
+        <p:txBody>
+          <a:bodyPr wrap="square">
+            <a:spAutoFit/>
+          </a:bodyPr>
+          <a:lstStyle/>
+          <a:p>
+            <a:r>
+              <a:rPr lang="en-US" sz="1400" dirty="0">
+                <a:solidFill>
+                  <a:schemeClr val="bg1">
+                    <a:lumMod val="50000"/>
+                  </a:schemeClr>
+                </a:solidFill>
+              </a:rPr>
+              <a:t>Scientific presentation </a:t>
+            </a:r>
+          </a:p>
+        </p:txBody>
+      </p:sp>
+      <p:sp>
+        <p:nvSpPr>
+          <p:cNvPr id="18" name="Rectangle 17"/>
+          <p:cNvSpPr/>
+          <p:nvPr/>
+        </p:nvSpPr>
+        <p:spPr>
+          <a:xfrm>
+            <a:off x="2548775" y="2205467"/>
+            <a:ext cx="1538843" cy="307777"/>
+          </a:xfrm>
+          <a:prstGeom prst="rect">
+            <a:avLst/>
+          </a:prstGeom>
+        </p:spPr>
+        <p:txBody>
+          <a:bodyPr wrap="square">
+            <a:spAutoFit/>
+          </a:bodyPr>
+          <a:lstStyle/>
+          <a:p>
+            <a:r>
+              <a:rPr lang="en-US" sz="1400" dirty="0">
+                <a:solidFill>
+                  <a:schemeClr val="bg1">
+                    <a:lumMod val="50000"/>
+                  </a:schemeClr>
+                </a:solidFill>
+              </a:rPr>
+              <a:t>Domain expertise</a:t>
+            </a:r>
+          </a:p>
+        </p:txBody>
+      </p:sp>
+      <p:sp>
+        <p:nvSpPr>
+          <p:cNvPr id="19" name="Rectangle 18"/>
+          <p:cNvSpPr/>
+          <p:nvPr/>
+        </p:nvSpPr>
+        <p:spPr>
+          <a:xfrm>
+            <a:off x="7374498" y="1776289"/>
+            <a:ext cx="1270738" cy="307777"/>
+          </a:xfrm>
+          <a:prstGeom prst="rect">
+            <a:avLst/>
+          </a:prstGeom>
+        </p:spPr>
+        <p:txBody>
+          <a:bodyPr wrap="square">
+            <a:spAutoFit/>
+          </a:bodyPr>
+          <a:lstStyle/>
+          <a:p>
+            <a:r>
+              <a:rPr lang="en-US" sz="1400" dirty="0">
+                <a:solidFill>
+                  <a:schemeClr val="bg1">
+                    <a:lumMod val="50000"/>
+                  </a:schemeClr>
+                </a:solidFill>
+              </a:rPr>
+              <a:t>Collaboration</a:t>
+            </a:r>
+          </a:p>
+        </p:txBody>
+      </p:sp>
+      <p:sp>
+        <p:nvSpPr>
+          <p:cNvPr id="20" name="Rectangle 19"/>
+          <p:cNvSpPr/>
+          <p:nvPr/>
+        </p:nvSpPr>
+        <p:spPr>
+          <a:xfrm>
+            <a:off x="3704627" y="1175674"/>
+            <a:ext cx="853888" cy="307777"/>
+          </a:xfrm>
+          <a:prstGeom prst="rect">
+            <a:avLst/>
+          </a:prstGeom>
+        </p:spPr>
+        <p:txBody>
+          <a:bodyPr wrap="none">
+            <a:spAutoFit/>
+          </a:bodyPr>
+          <a:lstStyle/>
+          <a:p>
+            <a:r>
+              <a:rPr lang="en-US" sz="1400" dirty="0">
+                <a:solidFill>
+                  <a:schemeClr val="bg1">
+                    <a:lumMod val="50000"/>
+                  </a:schemeClr>
+                </a:solidFill>
+              </a:rPr>
+              <a:t>Work-life</a:t>
+            </a:r>
+            <a:endParaRPr lang="nb-NO" sz="1400" dirty="0">
               <a:solidFill>
                 <a:schemeClr val="bg1">
                   <a:lumMod val="50000"/>
@@ -3884,10 +4328,249 @@
           </a:p>
         </p:txBody>
       </p:sp>
+      <p:sp>
+        <p:nvSpPr>
+          <p:cNvPr id="21" name="TextBox 20"/>
+          <p:cNvSpPr txBox="1"/>
+          <p:nvPr/>
+        </p:nvSpPr>
+        <p:spPr>
+          <a:xfrm>
+            <a:off x="4781322" y="2359355"/>
+            <a:ext cx="441146" cy="307777"/>
+          </a:xfrm>
+          <a:prstGeom prst="rect">
+            <a:avLst/>
+          </a:prstGeom>
+          <a:noFill/>
+        </p:spPr>
+        <p:txBody>
+          <a:bodyPr wrap="none" rtlCol="0">
+            <a:spAutoFit/>
+          </a:bodyPr>
+          <a:lstStyle/>
+          <a:p>
+            <a:r>
+              <a:rPr lang="nb-NO" sz="1400" dirty="0">
+                <a:solidFill>
+                  <a:schemeClr val="bg1">
+                    <a:lumMod val="50000"/>
+                  </a:schemeClr>
+                </a:solidFill>
+              </a:rPr>
+              <a:t>Lab</a:t>
+            </a:r>
+          </a:p>
+        </p:txBody>
+      </p:sp>
+      <p:sp>
+        <p:nvSpPr>
+          <p:cNvPr id="24" name="Rectangle 23"/>
+          <p:cNvSpPr/>
+          <p:nvPr/>
+        </p:nvSpPr>
+        <p:spPr>
+          <a:xfrm>
+            <a:off x="4497822" y="4028377"/>
+            <a:ext cx="1107837" cy="307777"/>
+          </a:xfrm>
+          <a:prstGeom prst="rect">
+            <a:avLst/>
+          </a:prstGeom>
+        </p:spPr>
+        <p:txBody>
+          <a:bodyPr wrap="square">
+            <a:spAutoFit/>
+          </a:bodyPr>
+          <a:lstStyle/>
+          <a:p>
+            <a:r>
+              <a:rPr lang="en-US" sz="1400" dirty="0">
+                <a:solidFill>
+                  <a:schemeClr val="bg1">
+                    <a:lumMod val="50000"/>
+                  </a:schemeClr>
+                </a:solidFill>
+              </a:rPr>
+              <a:t>Statistics</a:t>
+            </a:r>
+          </a:p>
+        </p:txBody>
+      </p:sp>
+      <p:sp>
+        <p:nvSpPr>
+          <p:cNvPr id="26" name="Rectangle 25"/>
+          <p:cNvSpPr/>
+          <p:nvPr/>
+        </p:nvSpPr>
+        <p:spPr>
+          <a:xfrm>
+            <a:off x="5324836" y="1741486"/>
+            <a:ext cx="1386808" cy="307777"/>
+          </a:xfrm>
+          <a:prstGeom prst="rect">
+            <a:avLst/>
+          </a:prstGeom>
+        </p:spPr>
+        <p:txBody>
+          <a:bodyPr wrap="square">
+            <a:spAutoFit/>
+          </a:bodyPr>
+          <a:lstStyle/>
+          <a:p>
+            <a:r>
+              <a:rPr lang="en-US" sz="1400" dirty="0">
+                <a:solidFill>
+                  <a:schemeClr val="bg1">
+                    <a:lumMod val="50000"/>
+                  </a:schemeClr>
+                </a:solidFill>
+              </a:rPr>
+              <a:t>Learn and use R</a:t>
+            </a:r>
+          </a:p>
+        </p:txBody>
+      </p:sp>
+      <p:sp>
+        <p:nvSpPr>
+          <p:cNvPr id="27" name="Rectangle 26"/>
+          <p:cNvSpPr/>
+          <p:nvPr/>
+        </p:nvSpPr>
+        <p:spPr>
+          <a:xfrm>
+            <a:off x="166057" y="1930177"/>
+            <a:ext cx="1130924" cy="307777"/>
+          </a:xfrm>
+          <a:prstGeom prst="rect">
+            <a:avLst/>
+          </a:prstGeom>
+        </p:spPr>
+        <p:txBody>
+          <a:bodyPr wrap="square">
+            <a:spAutoFit/>
+          </a:bodyPr>
+          <a:lstStyle/>
+          <a:p>
+            <a:r>
+              <a:rPr lang="en-US" sz="1400" dirty="0">
+                <a:solidFill>
+                  <a:schemeClr val="bg1">
+                    <a:lumMod val="50000"/>
+                  </a:schemeClr>
+                </a:solidFill>
+              </a:rPr>
+              <a:t>Documents</a:t>
+            </a:r>
+          </a:p>
+        </p:txBody>
+      </p:sp>
+      <p:sp>
+        <p:nvSpPr>
+          <p:cNvPr id="28" name="Rectangle 27"/>
+          <p:cNvSpPr/>
+          <p:nvPr/>
+        </p:nvSpPr>
+        <p:spPr>
+          <a:xfrm>
+            <a:off x="1361490" y="1433709"/>
+            <a:ext cx="1417540" cy="307777"/>
+          </a:xfrm>
+          <a:prstGeom prst="rect">
+            <a:avLst/>
+          </a:prstGeom>
+        </p:spPr>
+        <p:txBody>
+          <a:bodyPr wrap="square">
+            <a:spAutoFit/>
+          </a:bodyPr>
+          <a:lstStyle/>
+          <a:p>
+            <a:r>
+              <a:rPr lang="en-US" sz="1400" dirty="0">
+                <a:solidFill>
+                  <a:schemeClr val="bg1">
+                    <a:lumMod val="50000"/>
+                  </a:schemeClr>
+                </a:solidFill>
+              </a:rPr>
+              <a:t>Files and folders</a:t>
+            </a:r>
+          </a:p>
+        </p:txBody>
+      </p:sp>
+      <p:sp>
+        <p:nvSpPr>
+          <p:cNvPr id="29" name="Rectangle 28"/>
+          <p:cNvSpPr/>
+          <p:nvPr/>
+        </p:nvSpPr>
+        <p:spPr>
+          <a:xfrm>
+            <a:off x="1909085" y="4484162"/>
+            <a:ext cx="1554090" cy="307777"/>
+          </a:xfrm>
+          <a:prstGeom prst="rect">
+            <a:avLst/>
+          </a:prstGeom>
+        </p:spPr>
+        <p:txBody>
+          <a:bodyPr wrap="square">
+            <a:spAutoFit/>
+          </a:bodyPr>
+          <a:lstStyle/>
+          <a:p>
+            <a:r>
+              <a:rPr lang="en-US" sz="1400" dirty="0">
+                <a:solidFill>
+                  <a:schemeClr val="bg1">
+                    <a:lumMod val="50000"/>
+                  </a:schemeClr>
+                </a:solidFill>
+              </a:rPr>
+              <a:t>Management tools</a:t>
+            </a:r>
+          </a:p>
+        </p:txBody>
+      </p:sp>
+      <p:sp>
+        <p:nvSpPr>
+          <p:cNvPr id="30" name="Rectangle 29"/>
+          <p:cNvSpPr/>
+          <p:nvPr/>
+        </p:nvSpPr>
+        <p:spPr>
+          <a:xfrm>
+            <a:off x="5642755" y="2694285"/>
+            <a:ext cx="567902" cy="307777"/>
+          </a:xfrm>
+          <a:prstGeom prst="rect">
+            <a:avLst/>
+          </a:prstGeom>
+        </p:spPr>
+        <p:txBody>
+          <a:bodyPr wrap="square">
+            <a:spAutoFit/>
+          </a:bodyPr>
+          <a:lstStyle/>
+          <a:p>
+            <a:r>
+              <a:rPr lang="en-US" sz="1400" dirty="0">
+                <a:solidFill>
+                  <a:schemeClr val="bg1">
+                    <a:lumMod val="50000"/>
+                  </a:schemeClr>
+                </a:solidFill>
+              </a:rPr>
+              <a:t>Excel</a:t>
+            </a:r>
+          </a:p>
+        </p:txBody>
+      </p:sp>
     </p:spTree>
     <p:extLst>
       <p:ext uri="{BB962C8B-B14F-4D97-AF65-F5344CB8AC3E}">
-        <p14:creationId xmlns:p14="http://schemas.microsoft.com/office/powerpoint/2010/main" val="1141600645"/>
+        <p14:creationId xmlns:p14="http://schemas.microsoft.com/office/powerpoint/2010/main" val="3328741094"/>
       </p:ext>
     </p:extLst>
   </p:cSld>

</xml_diff>